<commit_message>
Link dos fontes atualizados
</commit_message>
<xml_diff>
--- a/003#20180905/PLSQL_CAMP_CRIPTOGRAFIA.pptx
+++ b/003#20180905/PLSQL_CAMP_CRIPTOGRAFIA.pptx
@@ -10649,7 +10649,19 @@
               <a:rPr lang="pt-BR" sz="1600" dirty="0">
                 <a:hlinkClick r:id="rId7"/>
               </a:rPr>
-              <a:t>https://github.com/plsqlcamp/Meetup/tree/master/003%2320180903/Source</a:t>
+              <a:t>https://github.com/plsqlcamp/Meetup/tree/master</a:t>
+            </a:r>
+            <a:r>
+              <a:rPr lang="pt-BR" sz="1600">
+                <a:hlinkClick r:id="rId7"/>
+              </a:rPr>
+              <a:t>/003%2320180905/</a:t>
+            </a:r>
+            <a:r>
+              <a:rPr lang="pt-BR" sz="1600" dirty="0">
+                <a:hlinkClick r:id="rId7"/>
+              </a:rPr>
+              <a:t>Source</a:t>
             </a:r>
             <a:endParaRPr lang="pt-BR" sz="1600" dirty="0"/>
           </a:p>
@@ -14000,6 +14012,133 @@
 </file>
 
 <file path=customXml/item1.xml><?xml version="1.0" encoding="utf-8"?>
+<p:properties xmlns:p="http://schemas.microsoft.com/office/2006/metadata/properties" xmlns:xsi="http://www.w3.org/2001/XMLSchema-instance" xmlns:pc="http://schemas.microsoft.com/office/infopath/2007/PartnerControls">
+  <documentManagement>
+    <DirectSourceMarket xmlns="4873beb7-5857-4685-be1f-d57550cc96cc" xsi:nil="true"/>
+    <ApprovalStatus xmlns="4873beb7-5857-4685-be1f-d57550cc96cc">InProgress</ApprovalStatus>
+    <MarketSpecific xmlns="4873beb7-5857-4685-be1f-d57550cc96cc">false</MarketSpecific>
+    <LocComments xmlns="4873beb7-5857-4685-be1f-d57550cc96cc" xsi:nil="true"/>
+    <ThumbnailAssetId xmlns="4873beb7-5857-4685-be1f-d57550cc96cc" xsi:nil="true"/>
+    <PrimaryImageGen xmlns="4873beb7-5857-4685-be1f-d57550cc96cc">false</PrimaryImageGen>
+    <LegacyData xmlns="4873beb7-5857-4685-be1f-d57550cc96cc" xsi:nil="true"/>
+    <LocRecommendedHandoff xmlns="4873beb7-5857-4685-be1f-d57550cc96cc" xsi:nil="true"/>
+    <BusinessGroup xmlns="4873beb7-5857-4685-be1f-d57550cc96cc" xsi:nil="true"/>
+    <BlockPublish xmlns="4873beb7-5857-4685-be1f-d57550cc96cc">false</BlockPublish>
+    <TPFriendlyName xmlns="4873beb7-5857-4685-be1f-d57550cc96cc" xsi:nil="true"/>
+    <NumericId xmlns="4873beb7-5857-4685-be1f-d57550cc96cc" xsi:nil="true"/>
+    <APEditor xmlns="4873beb7-5857-4685-be1f-d57550cc96cc">
+      <UserInfo>
+        <DisplayName/>
+        <AccountId xsi:nil="true"/>
+        <AccountType/>
+      </UserInfo>
+    </APEditor>
+    <SourceTitle xmlns="4873beb7-5857-4685-be1f-d57550cc96cc" xsi:nil="true"/>
+    <OpenTemplate xmlns="4873beb7-5857-4685-be1f-d57550cc96cc">true</OpenTemplate>
+    <UALocComments xmlns="4873beb7-5857-4685-be1f-d57550cc96cc" xsi:nil="true"/>
+    <ParentAssetId xmlns="4873beb7-5857-4685-be1f-d57550cc96cc" xsi:nil="true"/>
+    <IntlLangReviewDate xmlns="4873beb7-5857-4685-be1f-d57550cc96cc" xsi:nil="true"/>
+    <FeatureTagsTaxHTField0 xmlns="4873beb7-5857-4685-be1f-d57550cc96cc">
+      <Terms xmlns="http://schemas.microsoft.com/office/infopath/2007/PartnerControls"/>
+    </FeatureTagsTaxHTField0>
+    <PublishStatusLookup xmlns="4873beb7-5857-4685-be1f-d57550cc96cc">
+      <Value>1380992</Value>
+    </PublishStatusLookup>
+    <Providers xmlns="4873beb7-5857-4685-be1f-d57550cc96cc" xsi:nil="true"/>
+    <MachineTranslated xmlns="4873beb7-5857-4685-be1f-d57550cc96cc">false</MachineTranslated>
+    <OriginalSourceMarket xmlns="4873beb7-5857-4685-be1f-d57550cc96cc" xsi:nil="true"/>
+    <APDescription xmlns="4873beb7-5857-4685-be1f-d57550cc96cc">This template makes an impression with its bold red background, radial sunburst pattern, and contrasting black title bar. Consider it for your small business or marketing presentation. Or, take advantage of the red color scheme to make a holiday-themed presentation.  Compatible with PowerPoint 2013 and later, this template offers a variety of slide layouts including title slides, bulleted lists, photo with captions, a sample chart, and blank slide, all in a widescreen (16X9) format.
+</APDescription>
+    <ClipArtFilename xmlns="4873beb7-5857-4685-be1f-d57550cc96cc" xsi:nil="true"/>
+    <ContentItem xmlns="4873beb7-5857-4685-be1f-d57550cc96cc" xsi:nil="true"/>
+    <TPInstallLocation xmlns="4873beb7-5857-4685-be1f-d57550cc96cc" xsi:nil="true"/>
+    <PublishTargets xmlns="4873beb7-5857-4685-be1f-d57550cc96cc">OfficeOnlineVNext</PublishTargets>
+    <TimesCloned xmlns="4873beb7-5857-4685-be1f-d57550cc96cc" xsi:nil="true"/>
+    <AssetStart xmlns="4873beb7-5857-4685-be1f-d57550cc96cc">2011-12-19T18:35:00+00:00</AssetStart>
+    <Provider xmlns="4873beb7-5857-4685-be1f-d57550cc96cc" xsi:nil="true"/>
+    <AcquiredFrom xmlns="4873beb7-5857-4685-be1f-d57550cc96cc">Internal MS</AcquiredFrom>
+    <FriendlyTitle xmlns="4873beb7-5857-4685-be1f-d57550cc96cc" xsi:nil="true"/>
+    <LastHandOff xmlns="4873beb7-5857-4685-be1f-d57550cc96cc" xsi:nil="true"/>
+    <TPClientViewer xmlns="4873beb7-5857-4685-be1f-d57550cc96cc" xsi:nil="true"/>
+    <UACurrentWords xmlns="4873beb7-5857-4685-be1f-d57550cc96cc" xsi:nil="true"/>
+    <ArtSampleDocs xmlns="4873beb7-5857-4685-be1f-d57550cc96cc" xsi:nil="true"/>
+    <UALocRecommendation xmlns="4873beb7-5857-4685-be1f-d57550cc96cc">Localize</UALocRecommendation>
+    <Manager xmlns="4873beb7-5857-4685-be1f-d57550cc96cc" xsi:nil="true"/>
+    <ShowIn xmlns="4873beb7-5857-4685-be1f-d57550cc96cc">Show everywhere</ShowIn>
+    <UANotes xmlns="4873beb7-5857-4685-be1f-d57550cc96cc" xsi:nil="true"/>
+    <TemplateStatus xmlns="4873beb7-5857-4685-be1f-d57550cc96cc">Complete</TemplateStatus>
+    <InternalTagsTaxHTField0 xmlns="4873beb7-5857-4685-be1f-d57550cc96cc">
+      <Terms xmlns="http://schemas.microsoft.com/office/infopath/2007/PartnerControls"/>
+    </InternalTagsTaxHTField0>
+    <CSXHash xmlns="4873beb7-5857-4685-be1f-d57550cc96cc" xsi:nil="true"/>
+    <Downloads xmlns="4873beb7-5857-4685-be1f-d57550cc96cc">0</Downloads>
+    <VoteCount xmlns="4873beb7-5857-4685-be1f-d57550cc96cc" xsi:nil="true"/>
+    <OOCacheId xmlns="4873beb7-5857-4685-be1f-d57550cc96cc" xsi:nil="true"/>
+    <IsDeleted xmlns="4873beb7-5857-4685-be1f-d57550cc96cc">false</IsDeleted>
+    <AssetExpire xmlns="4873beb7-5857-4685-be1f-d57550cc96cc">2035-01-01T08:00:00+00:00</AssetExpire>
+    <DSATActionTaken xmlns="4873beb7-5857-4685-be1f-d57550cc96cc" xsi:nil="true"/>
+    <CSXSubmissionMarket xmlns="4873beb7-5857-4685-be1f-d57550cc96cc" xsi:nil="true"/>
+    <TPExecutable xmlns="4873beb7-5857-4685-be1f-d57550cc96cc" xsi:nil="true"/>
+    <SubmitterId xmlns="4873beb7-5857-4685-be1f-d57550cc96cc" xsi:nil="true"/>
+    <EditorialTags xmlns="4873beb7-5857-4685-be1f-d57550cc96cc" xsi:nil="true"/>
+    <ApprovalLog xmlns="4873beb7-5857-4685-be1f-d57550cc96cc" xsi:nil="true"/>
+    <AssetType xmlns="4873beb7-5857-4685-be1f-d57550cc96cc">TP</AssetType>
+    <BugNumber xmlns="4873beb7-5857-4685-be1f-d57550cc96cc" xsi:nil="true"/>
+    <CSXSubmissionDate xmlns="4873beb7-5857-4685-be1f-d57550cc96cc" xsi:nil="true"/>
+    <CSXUpdate xmlns="4873beb7-5857-4685-be1f-d57550cc96cc">false</CSXUpdate>
+    <Milestone xmlns="4873beb7-5857-4685-be1f-d57550cc96cc" xsi:nil="true"/>
+    <RecommendationsModifier xmlns="4873beb7-5857-4685-be1f-d57550cc96cc" xsi:nil="true"/>
+    <OriginAsset xmlns="4873beb7-5857-4685-be1f-d57550cc96cc" xsi:nil="true"/>
+    <TPComponent xmlns="4873beb7-5857-4685-be1f-d57550cc96cc" xsi:nil="true"/>
+    <AssetId xmlns="4873beb7-5857-4685-be1f-d57550cc96cc">TP102804893</AssetId>
+    <IntlLocPriority xmlns="4873beb7-5857-4685-be1f-d57550cc96cc" xsi:nil="true"/>
+    <PolicheckWords xmlns="4873beb7-5857-4685-be1f-d57550cc96cc" xsi:nil="true"/>
+    <TPLaunchHelpLink xmlns="4873beb7-5857-4685-be1f-d57550cc96cc" xsi:nil="true"/>
+    <TPApplication xmlns="4873beb7-5857-4685-be1f-d57550cc96cc" xsi:nil="true"/>
+    <CrawlForDependencies xmlns="4873beb7-5857-4685-be1f-d57550cc96cc">false</CrawlForDependencies>
+    <HandoffToMSDN xmlns="4873beb7-5857-4685-be1f-d57550cc96cc" xsi:nil="true"/>
+    <PlannedPubDate xmlns="4873beb7-5857-4685-be1f-d57550cc96cc" xsi:nil="true"/>
+    <IntlLangReviewer xmlns="4873beb7-5857-4685-be1f-d57550cc96cc" xsi:nil="true"/>
+    <TrustLevel xmlns="4873beb7-5857-4685-be1f-d57550cc96cc">1 Microsoft Managed Content</TrustLevel>
+    <LocLastLocAttemptVersionLookup xmlns="4873beb7-5857-4685-be1f-d57550cc96cc">725212</LocLastLocAttemptVersionLookup>
+    <IsSearchable xmlns="4873beb7-5857-4685-be1f-d57550cc96cc">true</IsSearchable>
+    <TemplateTemplateType xmlns="4873beb7-5857-4685-be1f-d57550cc96cc">PowerPoint Presentation Template</TemplateTemplateType>
+    <CampaignTagsTaxHTField0 xmlns="4873beb7-5857-4685-be1f-d57550cc96cc">
+      <Terms xmlns="http://schemas.microsoft.com/office/infopath/2007/PartnerControls"/>
+    </CampaignTagsTaxHTField0>
+    <TPNamespace xmlns="4873beb7-5857-4685-be1f-d57550cc96cc" xsi:nil="true"/>
+    <TaxCatchAll xmlns="4873beb7-5857-4685-be1f-d57550cc96cc"/>
+    <Markets xmlns="4873beb7-5857-4685-be1f-d57550cc96cc"/>
+    <UAProjectedTotalWords xmlns="4873beb7-5857-4685-be1f-d57550cc96cc" xsi:nil="true"/>
+    <IntlLangReview xmlns="4873beb7-5857-4685-be1f-d57550cc96cc">false</IntlLangReview>
+    <OutputCachingOn xmlns="4873beb7-5857-4685-be1f-d57550cc96cc">false</OutputCachingOn>
+    <AverageRating xmlns="4873beb7-5857-4685-be1f-d57550cc96cc" xsi:nil="true"/>
+    <APAuthor xmlns="4873beb7-5857-4685-be1f-d57550cc96cc">
+      <UserInfo>
+        <DisplayName>REDMOND\v-vaddu</DisplayName>
+        <AccountId>2567</AccountId>
+        <AccountType/>
+      </UserInfo>
+    </APAuthor>
+    <LocManualTestRequired xmlns="4873beb7-5857-4685-be1f-d57550cc96cc">false</LocManualTestRequired>
+    <TPCommandLine xmlns="4873beb7-5857-4685-be1f-d57550cc96cc" xsi:nil="true"/>
+    <TPAppVersion xmlns="4873beb7-5857-4685-be1f-d57550cc96cc" xsi:nil="true"/>
+    <EditorialStatus xmlns="4873beb7-5857-4685-be1f-d57550cc96cc">Complete</EditorialStatus>
+    <LastModifiedDateTime xmlns="4873beb7-5857-4685-be1f-d57550cc96cc" xsi:nil="true"/>
+    <ScenarioTagsTaxHTField0 xmlns="4873beb7-5857-4685-be1f-d57550cc96cc">
+      <Terms xmlns="http://schemas.microsoft.com/office/infopath/2007/PartnerControls"/>
+    </ScenarioTagsTaxHTField0>
+    <OriginalRelease xmlns="4873beb7-5857-4685-be1f-d57550cc96cc">14</OriginalRelease>
+    <TPLaunchHelpLinkType xmlns="4873beb7-5857-4685-be1f-d57550cc96cc">Template</TPLaunchHelpLinkType>
+    <LocalizationTagsTaxHTField0 xmlns="4873beb7-5857-4685-be1f-d57550cc96cc">
+      <Terms xmlns="http://schemas.microsoft.com/office/infopath/2007/PartnerControls"/>
+    </LocalizationTagsTaxHTField0>
+    <LocMarketGroupTiers2 xmlns="4873beb7-5857-4685-be1f-d57550cc96cc" xsi:nil="true"/>
+  </documentManagement>
+</p:properties>
+</file>
+
+<file path=customXml/item2.xml><?xml version="1.0" encoding="utf-8"?>
 <ct:contentTypeSchema xmlns:ct="http://schemas.microsoft.com/office/2006/metadata/contentType" xmlns:ma="http://schemas.microsoft.com/office/2006/metadata/properties/metaAttributes" ct:_="" ma:_="" ma:contentTypeName="TemplateFile" ma:contentTypeID="0x0101006EDDDB5EE6D98C44930B742096920B300400F5B6D36B3EF94B4E9A635CDF2A18F5B8" ma:contentTypeVersion="72" ma:contentTypeDescription="Create a new document." ma:contentTypeScope="" ma:versionID="a23e56308344d904b51738559c3d67c9">
   <xsd:schema xmlns:xsd="http://www.w3.org/2001/XMLSchema" xmlns:xs="http://www.w3.org/2001/XMLSchema" xmlns:p="http://schemas.microsoft.com/office/2006/metadata/properties" xmlns:ns2="4873beb7-5857-4685-be1f-d57550cc96cc" targetNamespace="http://schemas.microsoft.com/office/2006/metadata/properties" ma:root="true" ma:fieldsID="cd0908cc4600e77bf5da051303e00c8d" ns2:_="">
     <xsd:import namespace="4873beb7-5857-4685-be1f-d57550cc96cc"/>
@@ -15039,133 +15178,6 @@
 </ct:contentTypeSchema>
 </file>
 
-<file path=customXml/item2.xml><?xml version="1.0" encoding="utf-8"?>
-<p:properties xmlns:p="http://schemas.microsoft.com/office/2006/metadata/properties" xmlns:xsi="http://www.w3.org/2001/XMLSchema-instance" xmlns:pc="http://schemas.microsoft.com/office/infopath/2007/PartnerControls">
-  <documentManagement>
-    <DirectSourceMarket xmlns="4873beb7-5857-4685-be1f-d57550cc96cc" xsi:nil="true"/>
-    <ApprovalStatus xmlns="4873beb7-5857-4685-be1f-d57550cc96cc">InProgress</ApprovalStatus>
-    <MarketSpecific xmlns="4873beb7-5857-4685-be1f-d57550cc96cc">false</MarketSpecific>
-    <LocComments xmlns="4873beb7-5857-4685-be1f-d57550cc96cc" xsi:nil="true"/>
-    <ThumbnailAssetId xmlns="4873beb7-5857-4685-be1f-d57550cc96cc" xsi:nil="true"/>
-    <PrimaryImageGen xmlns="4873beb7-5857-4685-be1f-d57550cc96cc">false</PrimaryImageGen>
-    <LegacyData xmlns="4873beb7-5857-4685-be1f-d57550cc96cc" xsi:nil="true"/>
-    <LocRecommendedHandoff xmlns="4873beb7-5857-4685-be1f-d57550cc96cc" xsi:nil="true"/>
-    <BusinessGroup xmlns="4873beb7-5857-4685-be1f-d57550cc96cc" xsi:nil="true"/>
-    <BlockPublish xmlns="4873beb7-5857-4685-be1f-d57550cc96cc">false</BlockPublish>
-    <TPFriendlyName xmlns="4873beb7-5857-4685-be1f-d57550cc96cc" xsi:nil="true"/>
-    <NumericId xmlns="4873beb7-5857-4685-be1f-d57550cc96cc" xsi:nil="true"/>
-    <APEditor xmlns="4873beb7-5857-4685-be1f-d57550cc96cc">
-      <UserInfo>
-        <DisplayName/>
-        <AccountId xsi:nil="true"/>
-        <AccountType/>
-      </UserInfo>
-    </APEditor>
-    <SourceTitle xmlns="4873beb7-5857-4685-be1f-d57550cc96cc" xsi:nil="true"/>
-    <OpenTemplate xmlns="4873beb7-5857-4685-be1f-d57550cc96cc">true</OpenTemplate>
-    <UALocComments xmlns="4873beb7-5857-4685-be1f-d57550cc96cc" xsi:nil="true"/>
-    <ParentAssetId xmlns="4873beb7-5857-4685-be1f-d57550cc96cc" xsi:nil="true"/>
-    <IntlLangReviewDate xmlns="4873beb7-5857-4685-be1f-d57550cc96cc" xsi:nil="true"/>
-    <FeatureTagsTaxHTField0 xmlns="4873beb7-5857-4685-be1f-d57550cc96cc">
-      <Terms xmlns="http://schemas.microsoft.com/office/infopath/2007/PartnerControls"/>
-    </FeatureTagsTaxHTField0>
-    <PublishStatusLookup xmlns="4873beb7-5857-4685-be1f-d57550cc96cc">
-      <Value>1380992</Value>
-    </PublishStatusLookup>
-    <Providers xmlns="4873beb7-5857-4685-be1f-d57550cc96cc" xsi:nil="true"/>
-    <MachineTranslated xmlns="4873beb7-5857-4685-be1f-d57550cc96cc">false</MachineTranslated>
-    <OriginalSourceMarket xmlns="4873beb7-5857-4685-be1f-d57550cc96cc" xsi:nil="true"/>
-    <APDescription xmlns="4873beb7-5857-4685-be1f-d57550cc96cc">This template makes an impression with its bold red background, radial sunburst pattern, and contrasting black title bar. Consider it for your small business or marketing presentation. Or, take advantage of the red color scheme to make a holiday-themed presentation.  Compatible with PowerPoint 2013 and later, this template offers a variety of slide layouts including title slides, bulleted lists, photo with captions, a sample chart, and blank slide, all in a widescreen (16X9) format.
-</APDescription>
-    <ClipArtFilename xmlns="4873beb7-5857-4685-be1f-d57550cc96cc" xsi:nil="true"/>
-    <ContentItem xmlns="4873beb7-5857-4685-be1f-d57550cc96cc" xsi:nil="true"/>
-    <TPInstallLocation xmlns="4873beb7-5857-4685-be1f-d57550cc96cc" xsi:nil="true"/>
-    <PublishTargets xmlns="4873beb7-5857-4685-be1f-d57550cc96cc">OfficeOnlineVNext</PublishTargets>
-    <TimesCloned xmlns="4873beb7-5857-4685-be1f-d57550cc96cc" xsi:nil="true"/>
-    <AssetStart xmlns="4873beb7-5857-4685-be1f-d57550cc96cc">2011-12-19T18:35:00+00:00</AssetStart>
-    <Provider xmlns="4873beb7-5857-4685-be1f-d57550cc96cc" xsi:nil="true"/>
-    <AcquiredFrom xmlns="4873beb7-5857-4685-be1f-d57550cc96cc">Internal MS</AcquiredFrom>
-    <FriendlyTitle xmlns="4873beb7-5857-4685-be1f-d57550cc96cc" xsi:nil="true"/>
-    <LastHandOff xmlns="4873beb7-5857-4685-be1f-d57550cc96cc" xsi:nil="true"/>
-    <TPClientViewer xmlns="4873beb7-5857-4685-be1f-d57550cc96cc" xsi:nil="true"/>
-    <UACurrentWords xmlns="4873beb7-5857-4685-be1f-d57550cc96cc" xsi:nil="true"/>
-    <ArtSampleDocs xmlns="4873beb7-5857-4685-be1f-d57550cc96cc" xsi:nil="true"/>
-    <UALocRecommendation xmlns="4873beb7-5857-4685-be1f-d57550cc96cc">Localize</UALocRecommendation>
-    <Manager xmlns="4873beb7-5857-4685-be1f-d57550cc96cc" xsi:nil="true"/>
-    <ShowIn xmlns="4873beb7-5857-4685-be1f-d57550cc96cc">Show everywhere</ShowIn>
-    <UANotes xmlns="4873beb7-5857-4685-be1f-d57550cc96cc" xsi:nil="true"/>
-    <TemplateStatus xmlns="4873beb7-5857-4685-be1f-d57550cc96cc">Complete</TemplateStatus>
-    <InternalTagsTaxHTField0 xmlns="4873beb7-5857-4685-be1f-d57550cc96cc">
-      <Terms xmlns="http://schemas.microsoft.com/office/infopath/2007/PartnerControls"/>
-    </InternalTagsTaxHTField0>
-    <CSXHash xmlns="4873beb7-5857-4685-be1f-d57550cc96cc" xsi:nil="true"/>
-    <Downloads xmlns="4873beb7-5857-4685-be1f-d57550cc96cc">0</Downloads>
-    <VoteCount xmlns="4873beb7-5857-4685-be1f-d57550cc96cc" xsi:nil="true"/>
-    <OOCacheId xmlns="4873beb7-5857-4685-be1f-d57550cc96cc" xsi:nil="true"/>
-    <IsDeleted xmlns="4873beb7-5857-4685-be1f-d57550cc96cc">false</IsDeleted>
-    <AssetExpire xmlns="4873beb7-5857-4685-be1f-d57550cc96cc">2035-01-01T08:00:00+00:00</AssetExpire>
-    <DSATActionTaken xmlns="4873beb7-5857-4685-be1f-d57550cc96cc" xsi:nil="true"/>
-    <CSXSubmissionMarket xmlns="4873beb7-5857-4685-be1f-d57550cc96cc" xsi:nil="true"/>
-    <TPExecutable xmlns="4873beb7-5857-4685-be1f-d57550cc96cc" xsi:nil="true"/>
-    <SubmitterId xmlns="4873beb7-5857-4685-be1f-d57550cc96cc" xsi:nil="true"/>
-    <EditorialTags xmlns="4873beb7-5857-4685-be1f-d57550cc96cc" xsi:nil="true"/>
-    <ApprovalLog xmlns="4873beb7-5857-4685-be1f-d57550cc96cc" xsi:nil="true"/>
-    <AssetType xmlns="4873beb7-5857-4685-be1f-d57550cc96cc">TP</AssetType>
-    <BugNumber xmlns="4873beb7-5857-4685-be1f-d57550cc96cc" xsi:nil="true"/>
-    <CSXSubmissionDate xmlns="4873beb7-5857-4685-be1f-d57550cc96cc" xsi:nil="true"/>
-    <CSXUpdate xmlns="4873beb7-5857-4685-be1f-d57550cc96cc">false</CSXUpdate>
-    <Milestone xmlns="4873beb7-5857-4685-be1f-d57550cc96cc" xsi:nil="true"/>
-    <RecommendationsModifier xmlns="4873beb7-5857-4685-be1f-d57550cc96cc" xsi:nil="true"/>
-    <OriginAsset xmlns="4873beb7-5857-4685-be1f-d57550cc96cc" xsi:nil="true"/>
-    <TPComponent xmlns="4873beb7-5857-4685-be1f-d57550cc96cc" xsi:nil="true"/>
-    <AssetId xmlns="4873beb7-5857-4685-be1f-d57550cc96cc">TP102804893</AssetId>
-    <IntlLocPriority xmlns="4873beb7-5857-4685-be1f-d57550cc96cc" xsi:nil="true"/>
-    <PolicheckWords xmlns="4873beb7-5857-4685-be1f-d57550cc96cc" xsi:nil="true"/>
-    <TPLaunchHelpLink xmlns="4873beb7-5857-4685-be1f-d57550cc96cc" xsi:nil="true"/>
-    <TPApplication xmlns="4873beb7-5857-4685-be1f-d57550cc96cc" xsi:nil="true"/>
-    <CrawlForDependencies xmlns="4873beb7-5857-4685-be1f-d57550cc96cc">false</CrawlForDependencies>
-    <HandoffToMSDN xmlns="4873beb7-5857-4685-be1f-d57550cc96cc" xsi:nil="true"/>
-    <PlannedPubDate xmlns="4873beb7-5857-4685-be1f-d57550cc96cc" xsi:nil="true"/>
-    <IntlLangReviewer xmlns="4873beb7-5857-4685-be1f-d57550cc96cc" xsi:nil="true"/>
-    <TrustLevel xmlns="4873beb7-5857-4685-be1f-d57550cc96cc">1 Microsoft Managed Content</TrustLevel>
-    <LocLastLocAttemptVersionLookup xmlns="4873beb7-5857-4685-be1f-d57550cc96cc">725212</LocLastLocAttemptVersionLookup>
-    <IsSearchable xmlns="4873beb7-5857-4685-be1f-d57550cc96cc">true</IsSearchable>
-    <TemplateTemplateType xmlns="4873beb7-5857-4685-be1f-d57550cc96cc">PowerPoint Presentation Template</TemplateTemplateType>
-    <CampaignTagsTaxHTField0 xmlns="4873beb7-5857-4685-be1f-d57550cc96cc">
-      <Terms xmlns="http://schemas.microsoft.com/office/infopath/2007/PartnerControls"/>
-    </CampaignTagsTaxHTField0>
-    <TPNamespace xmlns="4873beb7-5857-4685-be1f-d57550cc96cc" xsi:nil="true"/>
-    <TaxCatchAll xmlns="4873beb7-5857-4685-be1f-d57550cc96cc"/>
-    <Markets xmlns="4873beb7-5857-4685-be1f-d57550cc96cc"/>
-    <UAProjectedTotalWords xmlns="4873beb7-5857-4685-be1f-d57550cc96cc" xsi:nil="true"/>
-    <IntlLangReview xmlns="4873beb7-5857-4685-be1f-d57550cc96cc">false</IntlLangReview>
-    <OutputCachingOn xmlns="4873beb7-5857-4685-be1f-d57550cc96cc">false</OutputCachingOn>
-    <AverageRating xmlns="4873beb7-5857-4685-be1f-d57550cc96cc" xsi:nil="true"/>
-    <APAuthor xmlns="4873beb7-5857-4685-be1f-d57550cc96cc">
-      <UserInfo>
-        <DisplayName>REDMOND\v-vaddu</DisplayName>
-        <AccountId>2567</AccountId>
-        <AccountType/>
-      </UserInfo>
-    </APAuthor>
-    <LocManualTestRequired xmlns="4873beb7-5857-4685-be1f-d57550cc96cc">false</LocManualTestRequired>
-    <TPCommandLine xmlns="4873beb7-5857-4685-be1f-d57550cc96cc" xsi:nil="true"/>
-    <TPAppVersion xmlns="4873beb7-5857-4685-be1f-d57550cc96cc" xsi:nil="true"/>
-    <EditorialStatus xmlns="4873beb7-5857-4685-be1f-d57550cc96cc">Complete</EditorialStatus>
-    <LastModifiedDateTime xmlns="4873beb7-5857-4685-be1f-d57550cc96cc" xsi:nil="true"/>
-    <ScenarioTagsTaxHTField0 xmlns="4873beb7-5857-4685-be1f-d57550cc96cc">
-      <Terms xmlns="http://schemas.microsoft.com/office/infopath/2007/PartnerControls"/>
-    </ScenarioTagsTaxHTField0>
-    <OriginalRelease xmlns="4873beb7-5857-4685-be1f-d57550cc96cc">14</OriginalRelease>
-    <TPLaunchHelpLinkType xmlns="4873beb7-5857-4685-be1f-d57550cc96cc">Template</TPLaunchHelpLinkType>
-    <LocalizationTagsTaxHTField0 xmlns="4873beb7-5857-4685-be1f-d57550cc96cc">
-      <Terms xmlns="http://schemas.microsoft.com/office/infopath/2007/PartnerControls"/>
-    </LocalizationTagsTaxHTField0>
-    <LocMarketGroupTiers2 xmlns="4873beb7-5857-4685-be1f-d57550cc96cc" xsi:nil="true"/>
-  </documentManagement>
-</p:properties>
-</file>
-
 <file path=customXml/item3.xml><?xml version="1.0" encoding="utf-8"?>
 <?mso-contentType ?>
 <FormTemplates xmlns="http://schemas.microsoft.com/sharepoint/v3/contenttype/forms">
@@ -15176,6 +15188,22 @@
 </file>
 
 <file path=customXml/itemProps1.xml><?xml version="1.0" encoding="utf-8"?>
+<ds:datastoreItem xmlns:ds="http://schemas.openxmlformats.org/officeDocument/2006/customXml" ds:itemID="{45076977-ECB7-44C2-A70D-853BB6B41242}">
+  <ds:schemaRefs>
+    <ds:schemaRef ds:uri="http://schemas.microsoft.com/office/2006/metadata/properties"/>
+    <ds:schemaRef ds:uri="http://schemas.microsoft.com/office/infopath/2007/PartnerControls"/>
+    <ds:schemaRef ds:uri="http://purl.org/dc/terms/"/>
+    <ds:schemaRef ds:uri="http://purl.org/dc/dcmitype/"/>
+    <ds:schemaRef ds:uri="4873beb7-5857-4685-be1f-d57550cc96cc"/>
+    <ds:schemaRef ds:uri="http://schemas.microsoft.com/office/2006/documentManagement/types"/>
+    <ds:schemaRef ds:uri="http://schemas.openxmlformats.org/package/2006/metadata/core-properties"/>
+    <ds:schemaRef ds:uri="http://www.w3.org/XML/1998/namespace"/>
+    <ds:schemaRef ds:uri="http://purl.org/dc/elements/1.1/"/>
+  </ds:schemaRefs>
+</ds:datastoreItem>
+</file>
+
+<file path=customXml/itemProps2.xml><?xml version="1.0" encoding="utf-8"?>
 <ds:datastoreItem xmlns:ds="http://schemas.openxmlformats.org/officeDocument/2006/customXml" ds:itemID="{41BC18E0-614B-4152-A3EE-8AA2B60C721E}">
   <ds:schemaRefs>
     <ds:schemaRef ds:uri="http://schemas.microsoft.com/office/2006/metadata/contentType"/>
@@ -15193,22 +15221,6 @@
 </ds:datastoreItem>
 </file>
 
-<file path=customXml/itemProps2.xml><?xml version="1.0" encoding="utf-8"?>
-<ds:datastoreItem xmlns:ds="http://schemas.openxmlformats.org/officeDocument/2006/customXml" ds:itemID="{45076977-ECB7-44C2-A70D-853BB6B41242}">
-  <ds:schemaRefs>
-    <ds:schemaRef ds:uri="http://schemas.microsoft.com/office/2006/metadata/properties"/>
-    <ds:schemaRef ds:uri="http://schemas.microsoft.com/office/infopath/2007/PartnerControls"/>
-    <ds:schemaRef ds:uri="http://purl.org/dc/terms/"/>
-    <ds:schemaRef ds:uri="http://purl.org/dc/dcmitype/"/>
-    <ds:schemaRef ds:uri="4873beb7-5857-4685-be1f-d57550cc96cc"/>
-    <ds:schemaRef ds:uri="http://schemas.microsoft.com/office/2006/documentManagement/types"/>
-    <ds:schemaRef ds:uri="http://schemas.openxmlformats.org/package/2006/metadata/core-properties"/>
-    <ds:schemaRef ds:uri="http://www.w3.org/XML/1998/namespace"/>
-    <ds:schemaRef ds:uri="http://purl.org/dc/elements/1.1/"/>
-  </ds:schemaRefs>
-</ds:datastoreItem>
-</file>
-
 <file path=customXml/itemProps3.xml><?xml version="1.0" encoding="utf-8"?>
 <ds:datastoreItem xmlns:ds="http://schemas.openxmlformats.org/officeDocument/2006/customXml" ds:itemID="{0A765CE0-A8A0-42E0-82D2-3F870DB4D5F7}">
   <ds:schemaRefs>

</xml_diff>